<commit_message>
#343 Draft shared with R&D, Air Liquide en Heineken.
</commit_message>
<xml_diff>
--- a/Articles/343/images/metadata-in-write-to-table.pptx
+++ b/Articles/343/images/metadata-in-write-to-table.pptx
@@ -5,14 +5,15 @@
     <p:sldMasterId id="2147483684" r:id="rId4"/>
   </p:sldMasterIdLst>
   <p:notesMasterIdLst>
-    <p:notesMasterId r:id="rId7"/>
+    <p:notesMasterId r:id="rId8"/>
   </p:notesMasterIdLst>
   <p:handoutMasterIdLst>
-    <p:handoutMasterId r:id="rId8"/>
+    <p:handoutMasterId r:id="rId9"/>
   </p:handoutMasterIdLst>
   <p:sldIdLst>
     <p:sldId id="256" r:id="rId5"/>
     <p:sldId id="257" r:id="rId6"/>
+    <p:sldId id="258" r:id="rId7"/>
   </p:sldIdLst>
   <p:sldSz cx="12192000" cy="6858000"/>
   <p:notesSz cx="6858000" cy="9144000"/>
@@ -248,7 +249,7 @@
             <a:fld id="{B1603AB5-52B7-8045-BEFE-97F8347DAEAC}" type="datetimeFigureOut">
               <a:rPr lang="en-US" smtClean="0"/>
               <a:pPr/>
-              <a:t>4/9/2020</a:t>
+              <a:t>4/13/2020</a:t>
             </a:fld>
             <a:endParaRPr lang="en-US"/>
           </a:p>
@@ -416,7 +417,7 @@
             <a:fld id="{EFF03303-0379-0E48-9B93-EC7286F8FEE5}" type="datetimeFigureOut">
               <a:rPr lang="en-US" smtClean="0"/>
               <a:pPr/>
-              <a:t>4/9/2020</a:t>
+              <a:t>4/13/2020</a:t>
             </a:fld>
             <a:endParaRPr lang="en-US"/>
           </a:p>
@@ -5254,6 +5255,1433 @@
     <p:extLst>
       <p:ext uri="{BB962C8B-B14F-4D97-AF65-F5344CB8AC3E}">
         <p14:creationId xmlns:p14="http://schemas.microsoft.com/office/powerpoint/2010/main" val="183880637"/>
+      </p:ext>
+    </p:extLst>
+  </p:cSld>
+  <p:clrMapOvr>
+    <a:masterClrMapping/>
+  </p:clrMapOvr>
+</p:sld>
+</file>
+
+<file path=ppt/slides/slide3.xml><?xml version="1.0" encoding="utf-8"?>
+<p:sld xmlns:a="http://schemas.openxmlformats.org/drawingml/2006/main" xmlns:r="http://schemas.openxmlformats.org/officeDocument/2006/relationships" xmlns:p="http://schemas.openxmlformats.org/presentationml/2006/main">
+  <p:cSld>
+    <p:spTree>
+      <p:nvGrpSpPr>
+        <p:cNvPr id="1" name=""/>
+        <p:cNvGrpSpPr/>
+        <p:nvPr/>
+      </p:nvGrpSpPr>
+      <p:grpSpPr>
+        <a:xfrm>
+          <a:off x="0" y="0"/>
+          <a:ext cx="0" cy="0"/>
+          <a:chOff x="0" y="0"/>
+          <a:chExt cx="0" cy="0"/>
+        </a:xfrm>
+      </p:grpSpPr>
+      <p:sp>
+        <p:nvSpPr>
+          <p:cNvPr id="2" name="Title 1">
+            <a:extLst>
+              <a:ext uri="{FF2B5EF4-FFF2-40B4-BE49-F238E27FC236}">
+                <a16:creationId xmlns:a16="http://schemas.microsoft.com/office/drawing/2014/main" id="{A461E292-8366-4DB7-8DF9-F413D68A2A73}"/>
+              </a:ext>
+            </a:extLst>
+          </p:cNvPr>
+          <p:cNvSpPr>
+            <a:spLocks noGrp="1"/>
+          </p:cNvSpPr>
+          <p:nvPr>
+            <p:ph type="title"/>
+          </p:nvPr>
+        </p:nvSpPr>
+        <p:spPr/>
+        <p:txBody>
+          <a:bodyPr/>
+          <a:lstStyle/>
+          <a:p>
+            <a:r>
+              <a:rPr lang="en-US" dirty="0"/>
+              <a:t>Customers and orders</a:t>
+            </a:r>
+          </a:p>
+        </p:txBody>
+      </p:sp>
+      <p:sp>
+        <p:nvSpPr>
+          <p:cNvPr id="3" name="Content Placeholder 2">
+            <a:extLst>
+              <a:ext uri="{FF2B5EF4-FFF2-40B4-BE49-F238E27FC236}">
+                <a16:creationId xmlns:a16="http://schemas.microsoft.com/office/drawing/2014/main" id="{4F84603C-FB85-4CA2-9C3F-74906F7EE8C8}"/>
+              </a:ext>
+            </a:extLst>
+          </p:cNvPr>
+          <p:cNvSpPr>
+            <a:spLocks noGrp="1"/>
+          </p:cNvSpPr>
+          <p:nvPr>
+            <p:ph idx="1"/>
+          </p:nvPr>
+        </p:nvSpPr>
+        <p:spPr>
+          <a:xfrm>
+            <a:off x="4864230" y="1406186"/>
+            <a:ext cx="2017338" cy="923028"/>
+          </a:xfrm>
+        </p:spPr>
+        <p:txBody>
+          <a:bodyPr/>
+          <a:lstStyle/>
+          <a:p>
+            <a:pPr marL="0" indent="0">
+              <a:buNone/>
+            </a:pPr>
+            <a:r>
+              <a:rPr lang="en-US" dirty="0"/>
+              <a:t>One to many relationships</a:t>
+            </a:r>
+          </a:p>
+        </p:txBody>
+      </p:sp>
+      <p:sp>
+        <p:nvSpPr>
+          <p:cNvPr id="4" name="Slide Number Placeholder 3">
+            <a:extLst>
+              <a:ext uri="{FF2B5EF4-FFF2-40B4-BE49-F238E27FC236}">
+                <a16:creationId xmlns:a16="http://schemas.microsoft.com/office/drawing/2014/main" id="{205F3053-81CB-4B8A-8E25-7C2D7B1D6D81}"/>
+              </a:ext>
+            </a:extLst>
+          </p:cNvPr>
+          <p:cNvSpPr>
+            <a:spLocks noGrp="1"/>
+          </p:cNvSpPr>
+          <p:nvPr>
+            <p:ph type="sldNum" sz="quarter" idx="4"/>
+          </p:nvPr>
+        </p:nvSpPr>
+        <p:spPr/>
+        <p:txBody>
+          <a:bodyPr/>
+          <a:lstStyle/>
+          <a:p>
+            <a:fld id="{937E74B9-F793-1749-8FE6-1D741809000E}" type="slidenum">
+              <a:rPr lang="en-US" smtClean="0"/>
+              <a:pPr/>
+              <a:t>3</a:t>
+            </a:fld>
+            <a:endParaRPr lang="en-US" dirty="0"/>
+          </a:p>
+        </p:txBody>
+      </p:sp>
+      <p:sp>
+        <p:nvSpPr>
+          <p:cNvPr id="5" name="Rectangle 4">
+            <a:extLst>
+              <a:ext uri="{FF2B5EF4-FFF2-40B4-BE49-F238E27FC236}">
+                <a16:creationId xmlns:a16="http://schemas.microsoft.com/office/drawing/2014/main" id="{BD07036A-0547-4DE8-AD4C-6BA89251B4B4}"/>
+              </a:ext>
+            </a:extLst>
+          </p:cNvPr>
+          <p:cNvSpPr/>
+          <p:nvPr/>
+        </p:nvSpPr>
+        <p:spPr>
+          <a:xfrm>
+            <a:off x="1762812" y="1409307"/>
+            <a:ext cx="2469823" cy="1621411"/>
+          </a:xfrm>
+          <a:prstGeom prst="rect">
+            <a:avLst/>
+          </a:prstGeom>
+          <a:solidFill>
+            <a:schemeClr val="accent5"/>
+          </a:solidFill>
+        </p:spPr>
+        <p:style>
+          <a:lnRef idx="1">
+            <a:schemeClr val="accent1"/>
+          </a:lnRef>
+          <a:fillRef idx="3">
+            <a:schemeClr val="accent1"/>
+          </a:fillRef>
+          <a:effectRef idx="2">
+            <a:schemeClr val="accent1"/>
+          </a:effectRef>
+          <a:fontRef idx="minor">
+            <a:schemeClr val="lt1"/>
+          </a:fontRef>
+        </p:style>
+        <p:txBody>
+          <a:bodyPr rtlCol="0" anchor="ctr"/>
+          <a:lstStyle/>
+          <a:p>
+            <a:r>
+              <a:rPr lang="en-US" dirty="0"/>
+              <a:t>Customers</a:t>
+            </a:r>
+          </a:p>
+          <a:p>
+            <a:pPr marL="285750" indent="-285750">
+              <a:buFontTx/>
+              <a:buChar char="-"/>
+            </a:pPr>
+            <a:r>
+              <a:rPr lang="en-US" dirty="0"/>
+              <a:t>Id</a:t>
+            </a:r>
+          </a:p>
+          <a:p>
+            <a:pPr marL="285750" indent="-285750">
+              <a:buFontTx/>
+              <a:buChar char="-"/>
+            </a:pPr>
+            <a:r>
+              <a:rPr lang="en-US" dirty="0"/>
+              <a:t>Address</a:t>
+            </a:r>
+          </a:p>
+          <a:p>
+            <a:pPr marL="285750" indent="-285750">
+              <a:buFontTx/>
+              <a:buChar char="-"/>
+            </a:pPr>
+            <a:r>
+              <a:rPr lang="en-US" dirty="0"/>
+              <a:t>Name</a:t>
+            </a:r>
+          </a:p>
+        </p:txBody>
+      </p:sp>
+      <p:sp>
+        <p:nvSpPr>
+          <p:cNvPr id="6" name="Rectangle 5">
+            <a:extLst>
+              <a:ext uri="{FF2B5EF4-FFF2-40B4-BE49-F238E27FC236}">
+                <a16:creationId xmlns:a16="http://schemas.microsoft.com/office/drawing/2014/main" id="{21CD68BD-B85F-4A9F-BFCA-0792AA455EBB}"/>
+              </a:ext>
+            </a:extLst>
+          </p:cNvPr>
+          <p:cNvSpPr/>
+          <p:nvPr/>
+        </p:nvSpPr>
+        <p:spPr>
+          <a:xfrm>
+            <a:off x="7305773" y="1867700"/>
+            <a:ext cx="2941163" cy="2809187"/>
+          </a:xfrm>
+          <a:prstGeom prst="rect">
+            <a:avLst/>
+          </a:prstGeom>
+          <a:solidFill>
+            <a:schemeClr val="accent3"/>
+          </a:solidFill>
+        </p:spPr>
+        <p:style>
+          <a:lnRef idx="1">
+            <a:schemeClr val="accent1"/>
+          </a:lnRef>
+          <a:fillRef idx="3">
+            <a:schemeClr val="accent1"/>
+          </a:fillRef>
+          <a:effectRef idx="2">
+            <a:schemeClr val="accent1"/>
+          </a:effectRef>
+          <a:fontRef idx="minor">
+            <a:schemeClr val="lt1"/>
+          </a:fontRef>
+        </p:style>
+        <p:txBody>
+          <a:bodyPr rtlCol="0" anchor="ctr"/>
+          <a:lstStyle/>
+          <a:p>
+            <a:r>
+              <a:rPr lang="en-US" dirty="0"/>
+              <a:t>Orders</a:t>
+            </a:r>
+          </a:p>
+          <a:p>
+            <a:pPr marL="285750" indent="-285750">
+              <a:buFontTx/>
+              <a:buChar char="-"/>
+            </a:pPr>
+            <a:r>
+              <a:rPr lang="en-US" dirty="0" err="1"/>
+              <a:t>customerId</a:t>
+            </a:r>
+            <a:endParaRPr lang="en-US" dirty="0"/>
+          </a:p>
+          <a:p>
+            <a:pPr marL="285750" indent="-285750">
+              <a:buFontTx/>
+              <a:buChar char="-"/>
+            </a:pPr>
+            <a:r>
+              <a:rPr lang="en-US" dirty="0" err="1"/>
+              <a:t>productId</a:t>
+            </a:r>
+            <a:endParaRPr lang="en-US" dirty="0"/>
+          </a:p>
+          <a:p>
+            <a:pPr marL="285750" indent="-285750">
+              <a:buFontTx/>
+              <a:buChar char="-"/>
+            </a:pPr>
+            <a:r>
+              <a:rPr lang="en-US" dirty="0" err="1"/>
+              <a:t>deliveryDate</a:t>
+            </a:r>
+            <a:endParaRPr lang="en-US" dirty="0"/>
+          </a:p>
+          <a:p>
+            <a:pPr marL="285750" indent="-285750">
+              <a:buFontTx/>
+              <a:buChar char="-"/>
+            </a:pPr>
+            <a:r>
+              <a:rPr lang="en-US" dirty="0"/>
+              <a:t>Amount</a:t>
+            </a:r>
+          </a:p>
+          <a:p>
+            <a:pPr marL="285750" indent="-285750">
+              <a:buFontTx/>
+              <a:buChar char="-"/>
+            </a:pPr>
+            <a:r>
+              <a:rPr lang="en-US" dirty="0"/>
+              <a:t>Prepaid</a:t>
+            </a:r>
+          </a:p>
+        </p:txBody>
+      </p:sp>
+      <p:cxnSp>
+        <p:nvCxnSpPr>
+          <p:cNvPr id="8" name="Straight Connector 7">
+            <a:extLst>
+              <a:ext uri="{FF2B5EF4-FFF2-40B4-BE49-F238E27FC236}">
+                <a16:creationId xmlns:a16="http://schemas.microsoft.com/office/drawing/2014/main" id="{3B17EAE3-B5A3-4055-B4A7-245A54D13498}"/>
+              </a:ext>
+            </a:extLst>
+          </p:cNvPr>
+          <p:cNvCxnSpPr>
+            <a:cxnSpLocks/>
+          </p:cNvCxnSpPr>
+          <p:nvPr/>
+        </p:nvCxnSpPr>
+        <p:spPr>
+          <a:xfrm>
+            <a:off x="4232635" y="2220012"/>
+            <a:ext cx="424206" cy="0"/>
+          </a:xfrm>
+          <a:prstGeom prst="line">
+            <a:avLst/>
+          </a:prstGeom>
+        </p:spPr>
+        <p:style>
+          <a:lnRef idx="2">
+            <a:schemeClr val="accent1"/>
+          </a:lnRef>
+          <a:fillRef idx="0">
+            <a:schemeClr val="accent1"/>
+          </a:fillRef>
+          <a:effectRef idx="1">
+            <a:schemeClr val="accent1"/>
+          </a:effectRef>
+          <a:fontRef idx="minor">
+            <a:schemeClr val="tx1"/>
+          </a:fontRef>
+        </p:style>
+      </p:cxnSp>
+      <p:cxnSp>
+        <p:nvCxnSpPr>
+          <p:cNvPr id="11" name="Straight Connector 10">
+            <a:extLst>
+              <a:ext uri="{FF2B5EF4-FFF2-40B4-BE49-F238E27FC236}">
+                <a16:creationId xmlns:a16="http://schemas.microsoft.com/office/drawing/2014/main" id="{93013A84-A903-4BBC-B787-B7BFEDA90E89}"/>
+              </a:ext>
+            </a:extLst>
+          </p:cNvPr>
+          <p:cNvCxnSpPr>
+            <a:cxnSpLocks/>
+          </p:cNvCxnSpPr>
+          <p:nvPr/>
+        </p:nvCxnSpPr>
+        <p:spPr>
+          <a:xfrm>
+            <a:off x="4656841" y="2220012"/>
+            <a:ext cx="2017337" cy="569924"/>
+          </a:xfrm>
+          <a:prstGeom prst="line">
+            <a:avLst/>
+          </a:prstGeom>
+        </p:spPr>
+        <p:style>
+          <a:lnRef idx="2">
+            <a:schemeClr val="accent1"/>
+          </a:lnRef>
+          <a:fillRef idx="0">
+            <a:schemeClr val="accent1"/>
+          </a:fillRef>
+          <a:effectRef idx="1">
+            <a:schemeClr val="accent1"/>
+          </a:effectRef>
+          <a:fontRef idx="minor">
+            <a:schemeClr val="tx1"/>
+          </a:fontRef>
+        </p:style>
+      </p:cxnSp>
+      <p:cxnSp>
+        <p:nvCxnSpPr>
+          <p:cNvPr id="13" name="Straight Connector 12">
+            <a:extLst>
+              <a:ext uri="{FF2B5EF4-FFF2-40B4-BE49-F238E27FC236}">
+                <a16:creationId xmlns:a16="http://schemas.microsoft.com/office/drawing/2014/main" id="{D6407FE9-DE96-41C4-AEFE-5B09AC7862A1}"/>
+              </a:ext>
+            </a:extLst>
+          </p:cNvPr>
+          <p:cNvCxnSpPr/>
+          <p:nvPr/>
+        </p:nvCxnSpPr>
+        <p:spPr>
+          <a:xfrm>
+            <a:off x="6674178" y="2781703"/>
+            <a:ext cx="631595" cy="0"/>
+          </a:xfrm>
+          <a:prstGeom prst="line">
+            <a:avLst/>
+          </a:prstGeom>
+        </p:spPr>
+        <p:style>
+          <a:lnRef idx="2">
+            <a:schemeClr val="accent1"/>
+          </a:lnRef>
+          <a:fillRef idx="0">
+            <a:schemeClr val="accent1"/>
+          </a:fillRef>
+          <a:effectRef idx="1">
+            <a:schemeClr val="accent1"/>
+          </a:effectRef>
+          <a:fontRef idx="minor">
+            <a:schemeClr val="tx1"/>
+          </a:fontRef>
+        </p:style>
+      </p:cxnSp>
+      <p:cxnSp>
+        <p:nvCxnSpPr>
+          <p:cNvPr id="15" name="Straight Connector 14">
+            <a:extLst>
+              <a:ext uri="{FF2B5EF4-FFF2-40B4-BE49-F238E27FC236}">
+                <a16:creationId xmlns:a16="http://schemas.microsoft.com/office/drawing/2014/main" id="{EC5917B6-23FE-45E8-B7DA-A4A9B820A508}"/>
+              </a:ext>
+            </a:extLst>
+          </p:cNvPr>
+          <p:cNvCxnSpPr>
+            <a:cxnSpLocks/>
+          </p:cNvCxnSpPr>
+          <p:nvPr/>
+        </p:nvCxnSpPr>
+        <p:spPr>
+          <a:xfrm flipV="1">
+            <a:off x="6660771" y="2461191"/>
+            <a:ext cx="631595" cy="320512"/>
+          </a:xfrm>
+          <a:prstGeom prst="line">
+            <a:avLst/>
+          </a:prstGeom>
+        </p:spPr>
+        <p:style>
+          <a:lnRef idx="2">
+            <a:schemeClr val="accent1"/>
+          </a:lnRef>
+          <a:fillRef idx="0">
+            <a:schemeClr val="accent1"/>
+          </a:fillRef>
+          <a:effectRef idx="1">
+            <a:schemeClr val="accent1"/>
+          </a:effectRef>
+          <a:fontRef idx="minor">
+            <a:schemeClr val="tx1"/>
+          </a:fontRef>
+        </p:style>
+      </p:cxnSp>
+      <p:cxnSp>
+        <p:nvCxnSpPr>
+          <p:cNvPr id="18" name="Straight Connector 17">
+            <a:extLst>
+              <a:ext uri="{FF2B5EF4-FFF2-40B4-BE49-F238E27FC236}">
+                <a16:creationId xmlns:a16="http://schemas.microsoft.com/office/drawing/2014/main" id="{97EFF754-7B88-48A9-BF01-46C19D99BF37}"/>
+              </a:ext>
+            </a:extLst>
+          </p:cNvPr>
+          <p:cNvCxnSpPr/>
+          <p:nvPr/>
+        </p:nvCxnSpPr>
+        <p:spPr>
+          <a:xfrm>
+            <a:off x="6660143" y="2781703"/>
+            <a:ext cx="631595" cy="292231"/>
+          </a:xfrm>
+          <a:prstGeom prst="line">
+            <a:avLst/>
+          </a:prstGeom>
+        </p:spPr>
+        <p:style>
+          <a:lnRef idx="2">
+            <a:schemeClr val="accent1"/>
+          </a:lnRef>
+          <a:fillRef idx="0">
+            <a:schemeClr val="accent1"/>
+          </a:fillRef>
+          <a:effectRef idx="1">
+            <a:schemeClr val="accent1"/>
+          </a:effectRef>
+          <a:fontRef idx="minor">
+            <a:schemeClr val="tx1"/>
+          </a:fontRef>
+        </p:style>
+      </p:cxnSp>
+      <p:cxnSp>
+        <p:nvCxnSpPr>
+          <p:cNvPr id="20" name="Straight Connector 19">
+            <a:extLst>
+              <a:ext uri="{FF2B5EF4-FFF2-40B4-BE49-F238E27FC236}">
+                <a16:creationId xmlns:a16="http://schemas.microsoft.com/office/drawing/2014/main" id="{860C4898-2025-411F-A43B-95718F0EDCD4}"/>
+              </a:ext>
+            </a:extLst>
+          </p:cNvPr>
+          <p:cNvCxnSpPr/>
+          <p:nvPr/>
+        </p:nvCxnSpPr>
+        <p:spPr>
+          <a:xfrm>
+            <a:off x="4322189" y="2088037"/>
+            <a:ext cx="0" cy="263950"/>
+          </a:xfrm>
+          <a:prstGeom prst="line">
+            <a:avLst/>
+          </a:prstGeom>
+        </p:spPr>
+        <p:style>
+          <a:lnRef idx="2">
+            <a:schemeClr val="accent1"/>
+          </a:lnRef>
+          <a:fillRef idx="0">
+            <a:schemeClr val="accent1"/>
+          </a:fillRef>
+          <a:effectRef idx="1">
+            <a:schemeClr val="accent1"/>
+          </a:effectRef>
+          <a:fontRef idx="minor">
+            <a:schemeClr val="tx1"/>
+          </a:fontRef>
+        </p:style>
+      </p:cxnSp>
+      <p:cxnSp>
+        <p:nvCxnSpPr>
+          <p:cNvPr id="22" name="Straight Connector 21">
+            <a:extLst>
+              <a:ext uri="{FF2B5EF4-FFF2-40B4-BE49-F238E27FC236}">
+                <a16:creationId xmlns:a16="http://schemas.microsoft.com/office/drawing/2014/main" id="{0DFC16A0-A610-45F3-A311-3E814CBCC39D}"/>
+              </a:ext>
+            </a:extLst>
+          </p:cNvPr>
+          <p:cNvCxnSpPr/>
+          <p:nvPr/>
+        </p:nvCxnSpPr>
+        <p:spPr>
+          <a:xfrm>
+            <a:off x="4496585" y="2088037"/>
+            <a:ext cx="0" cy="263950"/>
+          </a:xfrm>
+          <a:prstGeom prst="line">
+            <a:avLst/>
+          </a:prstGeom>
+        </p:spPr>
+        <p:style>
+          <a:lnRef idx="2">
+            <a:schemeClr val="accent1"/>
+          </a:lnRef>
+          <a:fillRef idx="0">
+            <a:schemeClr val="accent1"/>
+          </a:fillRef>
+          <a:effectRef idx="1">
+            <a:schemeClr val="accent1"/>
+          </a:effectRef>
+          <a:fontRef idx="minor">
+            <a:schemeClr val="tx1"/>
+          </a:fontRef>
+        </p:style>
+      </p:cxnSp>
+      <p:sp>
+        <p:nvSpPr>
+          <p:cNvPr id="23" name="Content Placeholder 2">
+            <a:extLst>
+              <a:ext uri="{FF2B5EF4-FFF2-40B4-BE49-F238E27FC236}">
+                <a16:creationId xmlns:a16="http://schemas.microsoft.com/office/drawing/2014/main" id="{2BD203C5-40AB-4AF9-9663-0DE268F76915}"/>
+              </a:ext>
+            </a:extLst>
+          </p:cNvPr>
+          <p:cNvSpPr txBox="1">
+            <a:spLocks/>
+          </p:cNvSpPr>
+          <p:nvPr/>
+        </p:nvSpPr>
+        <p:spPr>
+          <a:xfrm>
+            <a:off x="2117210" y="3112790"/>
+            <a:ext cx="1624473" cy="618735"/>
+          </a:xfrm>
+          <a:prstGeom prst="rect">
+            <a:avLst/>
+          </a:prstGeom>
+        </p:spPr>
+        <p:txBody>
+          <a:bodyPr/>
+          <a:lstStyle>
+            <a:lvl1pPr marL="179388" indent="-179388" algn="l" defTabSz="457200" rtl="0" eaLnBrk="1" fontAlgn="base" hangingPunct="1">
+              <a:lnSpc>
+                <a:spcPct val="150000"/>
+              </a:lnSpc>
+              <a:spcBef>
+                <a:spcPct val="20000"/>
+              </a:spcBef>
+              <a:spcAft>
+                <a:spcPct val="0"/>
+              </a:spcAft>
+              <a:buClr>
+                <a:srgbClr val="009B00"/>
+              </a:buClr>
+              <a:buFont typeface="Arial" panose="020B0604020202020204" pitchFamily="34" charset="0"/>
+              <a:buChar char="&gt;"/>
+              <a:defRPr sz="1800" kern="1200">
+                <a:solidFill>
+                  <a:srgbClr val="595959"/>
+                </a:solidFill>
+                <a:latin typeface="Arial" panose="020B0604020202020204" pitchFamily="34" charset="0"/>
+                <a:ea typeface="ＭＳ Ｐゴシック" pitchFamily="-107" charset="-128"/>
+                <a:cs typeface="Arial" panose="020B0604020202020204" pitchFamily="34" charset="0"/>
+              </a:defRPr>
+            </a:lvl1pPr>
+            <a:lvl2pPr marL="536575" indent="-177800" algn="l" defTabSz="457200" rtl="0" eaLnBrk="1" fontAlgn="base" hangingPunct="1">
+              <a:lnSpc>
+                <a:spcPct val="150000"/>
+              </a:lnSpc>
+              <a:spcBef>
+                <a:spcPct val="20000"/>
+              </a:spcBef>
+              <a:spcAft>
+                <a:spcPct val="0"/>
+              </a:spcAft>
+              <a:buFont typeface="Arial"/>
+              <a:buChar char="•"/>
+              <a:defRPr sz="1400" kern="1200">
+                <a:solidFill>
+                  <a:srgbClr val="595959"/>
+                </a:solidFill>
+                <a:latin typeface="Arial" panose="020B0604020202020204" pitchFamily="34" charset="0"/>
+                <a:ea typeface="ＭＳ Ｐゴシック" pitchFamily="-107" charset="-128"/>
+                <a:cs typeface="Arial" panose="020B0604020202020204" pitchFamily="34" charset="0"/>
+              </a:defRPr>
+            </a:lvl2pPr>
+            <a:lvl3pPr marL="635000" indent="98425" algn="l" defTabSz="457200" rtl="0" eaLnBrk="1" fontAlgn="base" hangingPunct="1">
+              <a:lnSpc>
+                <a:spcPct val="150000"/>
+              </a:lnSpc>
+              <a:spcBef>
+                <a:spcPct val="20000"/>
+              </a:spcBef>
+              <a:spcAft>
+                <a:spcPct val="0"/>
+              </a:spcAft>
+              <a:buFont typeface="Arial"/>
+              <a:buNone/>
+              <a:defRPr sz="1200" kern="1200">
+                <a:solidFill>
+                  <a:srgbClr val="595959"/>
+                </a:solidFill>
+                <a:latin typeface="Arial" panose="020B0604020202020204" pitchFamily="34" charset="0"/>
+                <a:ea typeface="ＭＳ Ｐゴシック" pitchFamily="-107" charset="-128"/>
+                <a:cs typeface="Arial" panose="020B0604020202020204" pitchFamily="34" charset="0"/>
+              </a:defRPr>
+            </a:lvl3pPr>
+            <a:lvl4pPr marL="635000" indent="98425" algn="l" defTabSz="457200" rtl="0" eaLnBrk="1" fontAlgn="base" hangingPunct="1">
+              <a:lnSpc>
+                <a:spcPct val="150000"/>
+              </a:lnSpc>
+              <a:spcBef>
+                <a:spcPct val="20000"/>
+              </a:spcBef>
+              <a:spcAft>
+                <a:spcPct val="0"/>
+              </a:spcAft>
+              <a:buFont typeface="Arial"/>
+              <a:buNone/>
+              <a:defRPr sz="1200" kern="1200">
+                <a:solidFill>
+                  <a:srgbClr val="595959"/>
+                </a:solidFill>
+                <a:latin typeface="Arial" panose="020B0604020202020204" pitchFamily="34" charset="0"/>
+                <a:ea typeface="ＭＳ Ｐゴシック" pitchFamily="-107" charset="-128"/>
+                <a:cs typeface="Arial" panose="020B0604020202020204" pitchFamily="34" charset="0"/>
+              </a:defRPr>
+            </a:lvl4pPr>
+            <a:lvl5pPr marL="635000" indent="98425" algn="l" defTabSz="457200" rtl="0" eaLnBrk="1" fontAlgn="base" hangingPunct="1">
+              <a:lnSpc>
+                <a:spcPct val="150000"/>
+              </a:lnSpc>
+              <a:spcBef>
+                <a:spcPct val="20000"/>
+              </a:spcBef>
+              <a:spcAft>
+                <a:spcPct val="0"/>
+              </a:spcAft>
+              <a:buFont typeface="Arial"/>
+              <a:buNone/>
+              <a:defRPr sz="1200" kern="1200">
+                <a:solidFill>
+                  <a:srgbClr val="595959"/>
+                </a:solidFill>
+                <a:latin typeface="Arial" panose="020B0604020202020204" pitchFamily="34" charset="0"/>
+                <a:ea typeface="ＭＳ Ｐゴシック" pitchFamily="-107" charset="-128"/>
+                <a:cs typeface="Arial" panose="020B0604020202020204" pitchFamily="34" charset="0"/>
+              </a:defRPr>
+            </a:lvl5pPr>
+            <a:lvl6pPr marL="2514600" indent="-228600" algn="l" defTabSz="457200" rtl="0" eaLnBrk="1" latinLnBrk="0" hangingPunct="1">
+              <a:spcBef>
+                <a:spcPct val="20000"/>
+              </a:spcBef>
+              <a:buFont typeface="Arial"/>
+              <a:buChar char="•"/>
+              <a:defRPr sz="2000" kern="1200">
+                <a:solidFill>
+                  <a:schemeClr val="tx1"/>
+                </a:solidFill>
+                <a:latin typeface="+mn-lt"/>
+                <a:ea typeface="+mn-ea"/>
+                <a:cs typeface="+mn-cs"/>
+              </a:defRPr>
+            </a:lvl6pPr>
+            <a:lvl7pPr marL="2971800" indent="-228600" algn="l" defTabSz="457200" rtl="0" eaLnBrk="1" latinLnBrk="0" hangingPunct="1">
+              <a:spcBef>
+                <a:spcPct val="20000"/>
+              </a:spcBef>
+              <a:buFont typeface="Arial"/>
+              <a:buChar char="•"/>
+              <a:defRPr sz="2000" kern="1200">
+                <a:solidFill>
+                  <a:schemeClr val="tx1"/>
+                </a:solidFill>
+                <a:latin typeface="+mn-lt"/>
+                <a:ea typeface="+mn-ea"/>
+                <a:cs typeface="+mn-cs"/>
+              </a:defRPr>
+            </a:lvl7pPr>
+            <a:lvl8pPr marL="3429000" indent="-228600" algn="l" defTabSz="457200" rtl="0" eaLnBrk="1" latinLnBrk="0" hangingPunct="1">
+              <a:spcBef>
+                <a:spcPct val="20000"/>
+              </a:spcBef>
+              <a:buFont typeface="Arial"/>
+              <a:buChar char="•"/>
+              <a:defRPr sz="2000" kern="1200">
+                <a:solidFill>
+                  <a:schemeClr val="tx1"/>
+                </a:solidFill>
+                <a:latin typeface="+mn-lt"/>
+                <a:ea typeface="+mn-ea"/>
+                <a:cs typeface="+mn-cs"/>
+              </a:defRPr>
+            </a:lvl8pPr>
+            <a:lvl9pPr marL="3886200" indent="-228600" algn="l" defTabSz="457200" rtl="0" eaLnBrk="1" latinLnBrk="0" hangingPunct="1">
+              <a:spcBef>
+                <a:spcPct val="20000"/>
+              </a:spcBef>
+              <a:buFont typeface="Arial"/>
+              <a:buChar char="•"/>
+              <a:defRPr sz="2000" kern="1200">
+                <a:solidFill>
+                  <a:schemeClr val="tx1"/>
+                </a:solidFill>
+                <a:latin typeface="+mn-lt"/>
+                <a:ea typeface="+mn-ea"/>
+                <a:cs typeface="+mn-cs"/>
+              </a:defRPr>
+            </a:lvl9pPr>
+          </a:lstStyle>
+          <a:p>
+            <a:pPr marL="0" indent="0">
+              <a:buFont typeface="Arial" panose="020B0604020202020204" pitchFamily="34" charset="0"/>
+              <a:buNone/>
+            </a:pPr>
+            <a:r>
+              <a:rPr lang="en-US" dirty="0"/>
+              <a:t>Parent tables</a:t>
+            </a:r>
+          </a:p>
+        </p:txBody>
+      </p:sp>
+      <p:sp>
+        <p:nvSpPr>
+          <p:cNvPr id="25" name="Content Placeholder 2">
+            <a:extLst>
+              <a:ext uri="{FF2B5EF4-FFF2-40B4-BE49-F238E27FC236}">
+                <a16:creationId xmlns:a16="http://schemas.microsoft.com/office/drawing/2014/main" id="{378402AD-95F2-4464-9FB8-382B1E1C59E6}"/>
+              </a:ext>
+            </a:extLst>
+          </p:cNvPr>
+          <p:cNvSpPr txBox="1">
+            <a:spLocks/>
+          </p:cNvSpPr>
+          <p:nvPr/>
+        </p:nvSpPr>
+        <p:spPr>
+          <a:xfrm>
+            <a:off x="8285623" y="4676887"/>
+            <a:ext cx="1307162" cy="618735"/>
+          </a:xfrm>
+          <a:prstGeom prst="rect">
+            <a:avLst/>
+          </a:prstGeom>
+        </p:spPr>
+        <p:txBody>
+          <a:bodyPr/>
+          <a:lstStyle>
+            <a:lvl1pPr marL="179388" indent="-179388" algn="l" defTabSz="457200" rtl="0" eaLnBrk="1" fontAlgn="base" hangingPunct="1">
+              <a:lnSpc>
+                <a:spcPct val="150000"/>
+              </a:lnSpc>
+              <a:spcBef>
+                <a:spcPct val="20000"/>
+              </a:spcBef>
+              <a:spcAft>
+                <a:spcPct val="0"/>
+              </a:spcAft>
+              <a:buClr>
+                <a:srgbClr val="009B00"/>
+              </a:buClr>
+              <a:buFont typeface="Arial" panose="020B0604020202020204" pitchFamily="34" charset="0"/>
+              <a:buChar char="&gt;"/>
+              <a:defRPr sz="1800" kern="1200">
+                <a:solidFill>
+                  <a:srgbClr val="595959"/>
+                </a:solidFill>
+                <a:latin typeface="Arial" panose="020B0604020202020204" pitchFamily="34" charset="0"/>
+                <a:ea typeface="ＭＳ Ｐゴシック" pitchFamily="-107" charset="-128"/>
+                <a:cs typeface="Arial" panose="020B0604020202020204" pitchFamily="34" charset="0"/>
+              </a:defRPr>
+            </a:lvl1pPr>
+            <a:lvl2pPr marL="536575" indent="-177800" algn="l" defTabSz="457200" rtl="0" eaLnBrk="1" fontAlgn="base" hangingPunct="1">
+              <a:lnSpc>
+                <a:spcPct val="150000"/>
+              </a:lnSpc>
+              <a:spcBef>
+                <a:spcPct val="20000"/>
+              </a:spcBef>
+              <a:spcAft>
+                <a:spcPct val="0"/>
+              </a:spcAft>
+              <a:buFont typeface="Arial"/>
+              <a:buChar char="•"/>
+              <a:defRPr sz="1400" kern="1200">
+                <a:solidFill>
+                  <a:srgbClr val="595959"/>
+                </a:solidFill>
+                <a:latin typeface="Arial" panose="020B0604020202020204" pitchFamily="34" charset="0"/>
+                <a:ea typeface="ＭＳ Ｐゴシック" pitchFamily="-107" charset="-128"/>
+                <a:cs typeface="Arial" panose="020B0604020202020204" pitchFamily="34" charset="0"/>
+              </a:defRPr>
+            </a:lvl2pPr>
+            <a:lvl3pPr marL="635000" indent="98425" algn="l" defTabSz="457200" rtl="0" eaLnBrk="1" fontAlgn="base" hangingPunct="1">
+              <a:lnSpc>
+                <a:spcPct val="150000"/>
+              </a:lnSpc>
+              <a:spcBef>
+                <a:spcPct val="20000"/>
+              </a:spcBef>
+              <a:spcAft>
+                <a:spcPct val="0"/>
+              </a:spcAft>
+              <a:buFont typeface="Arial"/>
+              <a:buNone/>
+              <a:defRPr sz="1200" kern="1200">
+                <a:solidFill>
+                  <a:srgbClr val="595959"/>
+                </a:solidFill>
+                <a:latin typeface="Arial" panose="020B0604020202020204" pitchFamily="34" charset="0"/>
+                <a:ea typeface="ＭＳ Ｐゴシック" pitchFamily="-107" charset="-128"/>
+                <a:cs typeface="Arial" panose="020B0604020202020204" pitchFamily="34" charset="0"/>
+              </a:defRPr>
+            </a:lvl3pPr>
+            <a:lvl4pPr marL="635000" indent="98425" algn="l" defTabSz="457200" rtl="0" eaLnBrk="1" fontAlgn="base" hangingPunct="1">
+              <a:lnSpc>
+                <a:spcPct val="150000"/>
+              </a:lnSpc>
+              <a:spcBef>
+                <a:spcPct val="20000"/>
+              </a:spcBef>
+              <a:spcAft>
+                <a:spcPct val="0"/>
+              </a:spcAft>
+              <a:buFont typeface="Arial"/>
+              <a:buNone/>
+              <a:defRPr sz="1200" kern="1200">
+                <a:solidFill>
+                  <a:srgbClr val="595959"/>
+                </a:solidFill>
+                <a:latin typeface="Arial" panose="020B0604020202020204" pitchFamily="34" charset="0"/>
+                <a:ea typeface="ＭＳ Ｐゴシック" pitchFamily="-107" charset="-128"/>
+                <a:cs typeface="Arial" panose="020B0604020202020204" pitchFamily="34" charset="0"/>
+              </a:defRPr>
+            </a:lvl4pPr>
+            <a:lvl5pPr marL="635000" indent="98425" algn="l" defTabSz="457200" rtl="0" eaLnBrk="1" fontAlgn="base" hangingPunct="1">
+              <a:lnSpc>
+                <a:spcPct val="150000"/>
+              </a:lnSpc>
+              <a:spcBef>
+                <a:spcPct val="20000"/>
+              </a:spcBef>
+              <a:spcAft>
+                <a:spcPct val="0"/>
+              </a:spcAft>
+              <a:buFont typeface="Arial"/>
+              <a:buNone/>
+              <a:defRPr sz="1200" kern="1200">
+                <a:solidFill>
+                  <a:srgbClr val="595959"/>
+                </a:solidFill>
+                <a:latin typeface="Arial" panose="020B0604020202020204" pitchFamily="34" charset="0"/>
+                <a:ea typeface="ＭＳ Ｐゴシック" pitchFamily="-107" charset="-128"/>
+                <a:cs typeface="Arial" panose="020B0604020202020204" pitchFamily="34" charset="0"/>
+              </a:defRPr>
+            </a:lvl5pPr>
+            <a:lvl6pPr marL="2514600" indent="-228600" algn="l" defTabSz="457200" rtl="0" eaLnBrk="1" latinLnBrk="0" hangingPunct="1">
+              <a:spcBef>
+                <a:spcPct val="20000"/>
+              </a:spcBef>
+              <a:buFont typeface="Arial"/>
+              <a:buChar char="•"/>
+              <a:defRPr sz="2000" kern="1200">
+                <a:solidFill>
+                  <a:schemeClr val="tx1"/>
+                </a:solidFill>
+                <a:latin typeface="+mn-lt"/>
+                <a:ea typeface="+mn-ea"/>
+                <a:cs typeface="+mn-cs"/>
+              </a:defRPr>
+            </a:lvl6pPr>
+            <a:lvl7pPr marL="2971800" indent="-228600" algn="l" defTabSz="457200" rtl="0" eaLnBrk="1" latinLnBrk="0" hangingPunct="1">
+              <a:spcBef>
+                <a:spcPct val="20000"/>
+              </a:spcBef>
+              <a:buFont typeface="Arial"/>
+              <a:buChar char="•"/>
+              <a:defRPr sz="2000" kern="1200">
+                <a:solidFill>
+                  <a:schemeClr val="tx1"/>
+                </a:solidFill>
+                <a:latin typeface="+mn-lt"/>
+                <a:ea typeface="+mn-ea"/>
+                <a:cs typeface="+mn-cs"/>
+              </a:defRPr>
+            </a:lvl7pPr>
+            <a:lvl8pPr marL="3429000" indent="-228600" algn="l" defTabSz="457200" rtl="0" eaLnBrk="1" latinLnBrk="0" hangingPunct="1">
+              <a:spcBef>
+                <a:spcPct val="20000"/>
+              </a:spcBef>
+              <a:buFont typeface="Arial"/>
+              <a:buChar char="•"/>
+              <a:defRPr sz="2000" kern="1200">
+                <a:solidFill>
+                  <a:schemeClr val="tx1"/>
+                </a:solidFill>
+                <a:latin typeface="+mn-lt"/>
+                <a:ea typeface="+mn-ea"/>
+                <a:cs typeface="+mn-cs"/>
+              </a:defRPr>
+            </a:lvl8pPr>
+            <a:lvl9pPr marL="3886200" indent="-228600" algn="l" defTabSz="457200" rtl="0" eaLnBrk="1" latinLnBrk="0" hangingPunct="1">
+              <a:spcBef>
+                <a:spcPct val="20000"/>
+              </a:spcBef>
+              <a:buFont typeface="Arial"/>
+              <a:buChar char="•"/>
+              <a:defRPr sz="2000" kern="1200">
+                <a:solidFill>
+                  <a:schemeClr val="tx1"/>
+                </a:solidFill>
+                <a:latin typeface="+mn-lt"/>
+                <a:ea typeface="+mn-ea"/>
+                <a:cs typeface="+mn-cs"/>
+              </a:defRPr>
+            </a:lvl9pPr>
+          </a:lstStyle>
+          <a:p>
+            <a:pPr marL="0" indent="0">
+              <a:buFont typeface="Arial" panose="020B0604020202020204" pitchFamily="34" charset="0"/>
+              <a:buNone/>
+            </a:pPr>
+            <a:r>
+              <a:rPr lang="en-US" dirty="0"/>
+              <a:t>Child table</a:t>
+            </a:r>
+          </a:p>
+        </p:txBody>
+      </p:sp>
+      <p:sp>
+        <p:nvSpPr>
+          <p:cNvPr id="16" name="Rectangle 15">
+            <a:extLst>
+              <a:ext uri="{FF2B5EF4-FFF2-40B4-BE49-F238E27FC236}">
+                <a16:creationId xmlns:a16="http://schemas.microsoft.com/office/drawing/2014/main" id="{92C5349D-A723-4D56-9FE4-F728AE09EAC5}"/>
+              </a:ext>
+            </a:extLst>
+          </p:cNvPr>
+          <p:cNvSpPr/>
+          <p:nvPr/>
+        </p:nvSpPr>
+        <p:spPr>
+          <a:xfrm>
+            <a:off x="1762812" y="3840220"/>
+            <a:ext cx="2469823" cy="1621411"/>
+          </a:xfrm>
+          <a:prstGeom prst="rect">
+            <a:avLst/>
+          </a:prstGeom>
+          <a:solidFill>
+            <a:schemeClr val="accent5"/>
+          </a:solidFill>
+        </p:spPr>
+        <p:style>
+          <a:lnRef idx="1">
+            <a:schemeClr val="accent1"/>
+          </a:lnRef>
+          <a:fillRef idx="3">
+            <a:schemeClr val="accent1"/>
+          </a:fillRef>
+          <a:effectRef idx="2">
+            <a:schemeClr val="accent1"/>
+          </a:effectRef>
+          <a:fontRef idx="minor">
+            <a:schemeClr val="lt1"/>
+          </a:fontRef>
+        </p:style>
+        <p:txBody>
+          <a:bodyPr rtlCol="0" anchor="ctr"/>
+          <a:lstStyle/>
+          <a:p>
+            <a:r>
+              <a:rPr lang="en-US" dirty="0"/>
+              <a:t>Product</a:t>
+            </a:r>
+          </a:p>
+          <a:p>
+            <a:pPr marL="285750" indent="-285750">
+              <a:buFontTx/>
+              <a:buChar char="-"/>
+            </a:pPr>
+            <a:r>
+              <a:rPr lang="en-US" dirty="0"/>
+              <a:t>Id</a:t>
+            </a:r>
+          </a:p>
+          <a:p>
+            <a:pPr marL="285750" indent="-285750">
+              <a:buFontTx/>
+              <a:buChar char="-"/>
+            </a:pPr>
+            <a:r>
+              <a:rPr lang="en-US" dirty="0"/>
+              <a:t>Name</a:t>
+            </a:r>
+          </a:p>
+          <a:p>
+            <a:pPr marL="285750" indent="-285750">
+              <a:buFontTx/>
+              <a:buChar char="-"/>
+            </a:pPr>
+            <a:r>
+              <a:rPr lang="en-US" dirty="0"/>
+              <a:t>Color</a:t>
+            </a:r>
+          </a:p>
+          <a:p>
+            <a:pPr marL="285750" indent="-285750">
+              <a:buFontTx/>
+              <a:buChar char="-"/>
+            </a:pPr>
+            <a:r>
+              <a:rPr lang="en-US" dirty="0"/>
+              <a:t>Size</a:t>
+            </a:r>
+          </a:p>
+        </p:txBody>
+      </p:sp>
+      <p:cxnSp>
+        <p:nvCxnSpPr>
+          <p:cNvPr id="24" name="Straight Connector 23">
+            <a:extLst>
+              <a:ext uri="{FF2B5EF4-FFF2-40B4-BE49-F238E27FC236}">
+                <a16:creationId xmlns:a16="http://schemas.microsoft.com/office/drawing/2014/main" id="{60726C57-824E-4C4E-9184-6C6A86EE5476}"/>
+              </a:ext>
+            </a:extLst>
+          </p:cNvPr>
+          <p:cNvCxnSpPr/>
+          <p:nvPr/>
+        </p:nvCxnSpPr>
+        <p:spPr>
+          <a:xfrm>
+            <a:off x="4444738" y="4468305"/>
+            <a:ext cx="0" cy="263950"/>
+          </a:xfrm>
+          <a:prstGeom prst="line">
+            <a:avLst/>
+          </a:prstGeom>
+        </p:spPr>
+        <p:style>
+          <a:lnRef idx="2">
+            <a:schemeClr val="accent1"/>
+          </a:lnRef>
+          <a:fillRef idx="0">
+            <a:schemeClr val="accent1"/>
+          </a:fillRef>
+          <a:effectRef idx="1">
+            <a:schemeClr val="accent1"/>
+          </a:effectRef>
+          <a:fontRef idx="minor">
+            <a:schemeClr val="tx1"/>
+          </a:fontRef>
+        </p:style>
+      </p:cxnSp>
+      <p:cxnSp>
+        <p:nvCxnSpPr>
+          <p:cNvPr id="26" name="Straight Connector 25">
+            <a:extLst>
+              <a:ext uri="{FF2B5EF4-FFF2-40B4-BE49-F238E27FC236}">
+                <a16:creationId xmlns:a16="http://schemas.microsoft.com/office/drawing/2014/main" id="{87DB3496-2251-408A-A8F7-75B22C5B9FC2}"/>
+              </a:ext>
+            </a:extLst>
+          </p:cNvPr>
+          <p:cNvCxnSpPr/>
+          <p:nvPr/>
+        </p:nvCxnSpPr>
+        <p:spPr>
+          <a:xfrm>
+            <a:off x="4656841" y="4468305"/>
+            <a:ext cx="0" cy="263950"/>
+          </a:xfrm>
+          <a:prstGeom prst="line">
+            <a:avLst/>
+          </a:prstGeom>
+        </p:spPr>
+        <p:style>
+          <a:lnRef idx="2">
+            <a:schemeClr val="accent1"/>
+          </a:lnRef>
+          <a:fillRef idx="0">
+            <a:schemeClr val="accent1"/>
+          </a:fillRef>
+          <a:effectRef idx="1">
+            <a:schemeClr val="accent1"/>
+          </a:effectRef>
+          <a:fontRef idx="minor">
+            <a:schemeClr val="tx1"/>
+          </a:fontRef>
+        </p:style>
+      </p:cxnSp>
+      <p:cxnSp>
+        <p:nvCxnSpPr>
+          <p:cNvPr id="27" name="Straight Connector 26">
+            <a:extLst>
+              <a:ext uri="{FF2B5EF4-FFF2-40B4-BE49-F238E27FC236}">
+                <a16:creationId xmlns:a16="http://schemas.microsoft.com/office/drawing/2014/main" id="{66690F1C-0FC7-4FD1-A79F-78CAA774A736}"/>
+              </a:ext>
+            </a:extLst>
+          </p:cNvPr>
+          <p:cNvCxnSpPr>
+            <a:cxnSpLocks/>
+          </p:cNvCxnSpPr>
+          <p:nvPr/>
+        </p:nvCxnSpPr>
+        <p:spPr>
+          <a:xfrm>
+            <a:off x="4253270" y="4600279"/>
+            <a:ext cx="610960" cy="0"/>
+          </a:xfrm>
+          <a:prstGeom prst="line">
+            <a:avLst/>
+          </a:prstGeom>
+        </p:spPr>
+        <p:style>
+          <a:lnRef idx="2">
+            <a:schemeClr val="accent1"/>
+          </a:lnRef>
+          <a:fillRef idx="0">
+            <a:schemeClr val="accent1"/>
+          </a:fillRef>
+          <a:effectRef idx="1">
+            <a:schemeClr val="accent1"/>
+          </a:effectRef>
+          <a:fontRef idx="minor">
+            <a:schemeClr val="tx1"/>
+          </a:fontRef>
+        </p:style>
+      </p:cxnSp>
+      <p:cxnSp>
+        <p:nvCxnSpPr>
+          <p:cNvPr id="28" name="Straight Connector 27">
+            <a:extLst>
+              <a:ext uri="{FF2B5EF4-FFF2-40B4-BE49-F238E27FC236}">
+                <a16:creationId xmlns:a16="http://schemas.microsoft.com/office/drawing/2014/main" id="{E349F3C0-DB5B-4D88-95A6-1DE6BBFE18AF}"/>
+              </a:ext>
+            </a:extLst>
+          </p:cNvPr>
+          <p:cNvCxnSpPr>
+            <a:cxnSpLocks/>
+          </p:cNvCxnSpPr>
+          <p:nvPr/>
+        </p:nvCxnSpPr>
+        <p:spPr>
+          <a:xfrm flipV="1">
+            <a:off x="4875204" y="3791477"/>
+            <a:ext cx="1798974" cy="809308"/>
+          </a:xfrm>
+          <a:prstGeom prst="line">
+            <a:avLst/>
+          </a:prstGeom>
+        </p:spPr>
+        <p:style>
+          <a:lnRef idx="2">
+            <a:schemeClr val="accent1"/>
+          </a:lnRef>
+          <a:fillRef idx="0">
+            <a:schemeClr val="accent1"/>
+          </a:fillRef>
+          <a:effectRef idx="1">
+            <a:schemeClr val="accent1"/>
+          </a:effectRef>
+          <a:fontRef idx="minor">
+            <a:schemeClr val="tx1"/>
+          </a:fontRef>
+        </p:style>
+      </p:cxnSp>
+      <p:cxnSp>
+        <p:nvCxnSpPr>
+          <p:cNvPr id="30" name="Straight Connector 29">
+            <a:extLst>
+              <a:ext uri="{FF2B5EF4-FFF2-40B4-BE49-F238E27FC236}">
+                <a16:creationId xmlns:a16="http://schemas.microsoft.com/office/drawing/2014/main" id="{D0EB4312-30AE-4479-8678-EB3D2057B4AA}"/>
+              </a:ext>
+            </a:extLst>
+          </p:cNvPr>
+          <p:cNvCxnSpPr>
+            <a:cxnSpLocks/>
+          </p:cNvCxnSpPr>
+          <p:nvPr/>
+        </p:nvCxnSpPr>
+        <p:spPr>
+          <a:xfrm flipV="1">
+            <a:off x="6660771" y="3458434"/>
+            <a:ext cx="631595" cy="320512"/>
+          </a:xfrm>
+          <a:prstGeom prst="line">
+            <a:avLst/>
+          </a:prstGeom>
+        </p:spPr>
+        <p:style>
+          <a:lnRef idx="2">
+            <a:schemeClr val="accent1"/>
+          </a:lnRef>
+          <a:fillRef idx="0">
+            <a:schemeClr val="accent1"/>
+          </a:fillRef>
+          <a:effectRef idx="1">
+            <a:schemeClr val="accent1"/>
+          </a:effectRef>
+          <a:fontRef idx="minor">
+            <a:schemeClr val="tx1"/>
+          </a:fontRef>
+        </p:style>
+      </p:cxnSp>
+      <p:cxnSp>
+        <p:nvCxnSpPr>
+          <p:cNvPr id="31" name="Straight Connector 30">
+            <a:extLst>
+              <a:ext uri="{FF2B5EF4-FFF2-40B4-BE49-F238E27FC236}">
+                <a16:creationId xmlns:a16="http://schemas.microsoft.com/office/drawing/2014/main" id="{2219E176-54C8-431A-BD35-36929F1A803F}"/>
+              </a:ext>
+            </a:extLst>
+          </p:cNvPr>
+          <p:cNvCxnSpPr>
+            <a:cxnSpLocks/>
+          </p:cNvCxnSpPr>
+          <p:nvPr/>
+        </p:nvCxnSpPr>
+        <p:spPr>
+          <a:xfrm flipV="1">
+            <a:off x="6685152" y="3754963"/>
+            <a:ext cx="607214" cy="36514"/>
+          </a:xfrm>
+          <a:prstGeom prst="line">
+            <a:avLst/>
+          </a:prstGeom>
+        </p:spPr>
+        <p:style>
+          <a:lnRef idx="2">
+            <a:schemeClr val="accent1"/>
+          </a:lnRef>
+          <a:fillRef idx="0">
+            <a:schemeClr val="accent1"/>
+          </a:fillRef>
+          <a:effectRef idx="1">
+            <a:schemeClr val="accent1"/>
+          </a:effectRef>
+          <a:fontRef idx="minor">
+            <a:schemeClr val="tx1"/>
+          </a:fontRef>
+        </p:style>
+      </p:cxnSp>
+      <p:cxnSp>
+        <p:nvCxnSpPr>
+          <p:cNvPr id="33" name="Straight Connector 32">
+            <a:extLst>
+              <a:ext uri="{FF2B5EF4-FFF2-40B4-BE49-F238E27FC236}">
+                <a16:creationId xmlns:a16="http://schemas.microsoft.com/office/drawing/2014/main" id="{D723C643-97A4-4B44-A1ED-341EB6A7F6C9}"/>
+              </a:ext>
+            </a:extLst>
+          </p:cNvPr>
+          <p:cNvCxnSpPr>
+            <a:cxnSpLocks/>
+          </p:cNvCxnSpPr>
+          <p:nvPr/>
+        </p:nvCxnSpPr>
+        <p:spPr>
+          <a:xfrm>
+            <a:off x="6685152" y="3812219"/>
+            <a:ext cx="615906" cy="148118"/>
+          </a:xfrm>
+          <a:prstGeom prst="line">
+            <a:avLst/>
+          </a:prstGeom>
+        </p:spPr>
+        <p:style>
+          <a:lnRef idx="2">
+            <a:schemeClr val="accent1"/>
+          </a:lnRef>
+          <a:fillRef idx="0">
+            <a:schemeClr val="accent1"/>
+          </a:fillRef>
+          <a:effectRef idx="1">
+            <a:schemeClr val="accent1"/>
+          </a:effectRef>
+          <a:fontRef idx="minor">
+            <a:schemeClr val="tx1"/>
+          </a:fontRef>
+        </p:style>
+      </p:cxnSp>
+      <p:sp>
+        <p:nvSpPr>
+          <p:cNvPr id="35" name="Right Brace 34">
+            <a:extLst>
+              <a:ext uri="{FF2B5EF4-FFF2-40B4-BE49-F238E27FC236}">
+                <a16:creationId xmlns:a16="http://schemas.microsoft.com/office/drawing/2014/main" id="{DDD57FC2-6191-41B4-9601-B5BD43C4EC25}"/>
+              </a:ext>
+            </a:extLst>
+          </p:cNvPr>
+          <p:cNvSpPr/>
+          <p:nvPr/>
+        </p:nvSpPr>
+        <p:spPr>
+          <a:xfrm>
+            <a:off x="8939204" y="2781703"/>
+            <a:ext cx="355836" cy="748228"/>
+          </a:xfrm>
+          <a:prstGeom prst="rightBrace">
+            <a:avLst/>
+          </a:prstGeom>
+        </p:spPr>
+        <p:style>
+          <a:lnRef idx="2">
+            <a:schemeClr val="accent1"/>
+          </a:lnRef>
+          <a:fillRef idx="0">
+            <a:schemeClr val="accent1"/>
+          </a:fillRef>
+          <a:effectRef idx="1">
+            <a:schemeClr val="accent1"/>
+          </a:effectRef>
+          <a:fontRef idx="minor">
+            <a:schemeClr val="tx1"/>
+          </a:fontRef>
+        </p:style>
+        <p:txBody>
+          <a:bodyPr rtlCol="0" anchor="ctr"/>
+          <a:lstStyle/>
+          <a:p>
+            <a:pPr algn="ctr"/>
+            <a:endParaRPr lang="en-US"/>
+          </a:p>
+        </p:txBody>
+      </p:sp>
+      <p:sp>
+        <p:nvSpPr>
+          <p:cNvPr id="36" name="Rectangle 35">
+            <a:extLst>
+              <a:ext uri="{FF2B5EF4-FFF2-40B4-BE49-F238E27FC236}">
+                <a16:creationId xmlns:a16="http://schemas.microsoft.com/office/drawing/2014/main" id="{BBDAD4A0-B57A-451A-A147-7061E212CC1A}"/>
+              </a:ext>
+            </a:extLst>
+          </p:cNvPr>
+          <p:cNvSpPr/>
+          <p:nvPr/>
+        </p:nvSpPr>
+        <p:spPr>
+          <a:xfrm>
+            <a:off x="9259372" y="2957243"/>
+            <a:ext cx="676480" cy="417141"/>
+          </a:xfrm>
+          <a:prstGeom prst="rect">
+            <a:avLst/>
+          </a:prstGeom>
+          <a:noFill/>
+          <a:ln>
+            <a:noFill/>
+          </a:ln>
+        </p:spPr>
+        <p:style>
+          <a:lnRef idx="1">
+            <a:schemeClr val="accent1"/>
+          </a:lnRef>
+          <a:fillRef idx="3">
+            <a:schemeClr val="accent1"/>
+          </a:fillRef>
+          <a:effectRef idx="2">
+            <a:schemeClr val="accent1"/>
+          </a:effectRef>
+          <a:fontRef idx="minor">
+            <a:schemeClr val="lt1"/>
+          </a:fontRef>
+        </p:style>
+        <p:txBody>
+          <a:bodyPr rtlCol="0" anchor="ctr"/>
+          <a:lstStyle/>
+          <a:p>
+            <a:pPr algn="ctr"/>
+            <a:r>
+              <a:rPr lang="en-US" dirty="0">
+                <a:solidFill>
+                  <a:schemeClr val="tx1"/>
+                </a:solidFill>
+              </a:rPr>
+              <a:t>Key</a:t>
+            </a:r>
+          </a:p>
+        </p:txBody>
+      </p:sp>
+    </p:spTree>
+    <p:extLst>
+      <p:ext uri="{BB962C8B-B14F-4D97-AF65-F5344CB8AC3E}">
+        <p14:creationId xmlns:p14="http://schemas.microsoft.com/office/powerpoint/2010/main" val="4050424851"/>
       </p:ext>
     </p:extLst>
   </p:cSld>
@@ -6246,9 +7674,12 @@
 </file>
 
 <file path=customXml/item1.xml><?xml version="1.0" encoding="utf-8"?>
-<p:properties xmlns:p="http://schemas.microsoft.com/office/2006/metadata/properties" xmlns:xsi="http://www.w3.org/2001/XMLSchema-instance" xmlns:pc="http://schemas.microsoft.com/office/infopath/2007/PartnerControls">
-  <documentManagement/>
-</p:properties>
+<?mso-contentType ?>
+<FormTemplates xmlns="http://schemas.microsoft.com/sharepoint/v3/contenttype/forms">
+  <Display>DocumentLibraryForm</Display>
+  <Edit>DocumentLibraryForm</Edit>
+  <New>DocumentLibraryForm</New>
+</FormTemplates>
 </file>
 
 <file path=customXml/item2.xml><?xml version="1.0" encoding="utf-8"?>
@@ -6406,26 +7837,15 @@
 </file>
 
 <file path=customXml/item3.xml><?xml version="1.0" encoding="utf-8"?>
-<?mso-contentType ?>
-<FormTemplates xmlns="http://schemas.microsoft.com/sharepoint/v3/contenttype/forms">
-  <Display>DocumentLibraryForm</Display>
-  <Edit>DocumentLibraryForm</Edit>
-  <New>DocumentLibraryForm</New>
-</FormTemplates>
+<p:properties xmlns:p="http://schemas.microsoft.com/office/2006/metadata/properties" xmlns:xsi="http://www.w3.org/2001/XMLSchema-instance" xmlns:pc="http://schemas.microsoft.com/office/infopath/2007/PartnerControls">
+  <documentManagement/>
+</p:properties>
 </file>
 
 <file path=customXml/itemProps1.xml><?xml version="1.0" encoding="utf-8"?>
-<ds:datastoreItem xmlns:ds="http://schemas.openxmlformats.org/officeDocument/2006/customXml" ds:itemID="{F4BD4880-0C9A-491D-872C-CB84E58DA4AE}">
+<ds:datastoreItem xmlns:ds="http://schemas.openxmlformats.org/officeDocument/2006/customXml" ds:itemID="{74BCA57B-8451-400D-AF6D-A9DBB4806AF2}">
   <ds:schemaRefs>
-    <ds:schemaRef ds:uri="67d1ba68-3275-44c2-9ddb-2f8511f2ccbb"/>
-    <ds:schemaRef ds:uri="http://purl.org/dc/elements/1.1/"/>
-    <ds:schemaRef ds:uri="http://purl.org/dc/terms/"/>
-    <ds:schemaRef ds:uri="http://schemas.microsoft.com/office/infopath/2007/PartnerControls"/>
-    <ds:schemaRef ds:uri="http://schemas.openxmlformats.org/package/2006/metadata/core-properties"/>
-    <ds:schemaRef ds:uri="http://schemas.microsoft.com/office/2006/documentManagement/types"/>
-    <ds:schemaRef ds:uri="http://schemas.microsoft.com/office/2006/metadata/properties"/>
-    <ds:schemaRef ds:uri="http://www.w3.org/XML/1998/namespace"/>
-    <ds:schemaRef ds:uri="http://purl.org/dc/dcmitype/"/>
+    <ds:schemaRef ds:uri="http://schemas.microsoft.com/sharepoint/v3/contenttype/forms"/>
   </ds:schemaRefs>
 </ds:datastoreItem>
 </file>
@@ -6449,9 +7869,17 @@
 </file>
 
 <file path=customXml/itemProps3.xml><?xml version="1.0" encoding="utf-8"?>
-<ds:datastoreItem xmlns:ds="http://schemas.openxmlformats.org/officeDocument/2006/customXml" ds:itemID="{74BCA57B-8451-400D-AF6D-A9DBB4806AF2}">
+<ds:datastoreItem xmlns:ds="http://schemas.openxmlformats.org/officeDocument/2006/customXml" ds:itemID="{F4BD4880-0C9A-491D-872C-CB84E58DA4AE}">
   <ds:schemaRefs>
-    <ds:schemaRef ds:uri="http://schemas.microsoft.com/sharepoint/v3/contenttype/forms"/>
+    <ds:schemaRef ds:uri="67d1ba68-3275-44c2-9ddb-2f8511f2ccbb"/>
+    <ds:schemaRef ds:uri="http://purl.org/dc/elements/1.1/"/>
+    <ds:schemaRef ds:uri="http://purl.org/dc/terms/"/>
+    <ds:schemaRef ds:uri="http://schemas.microsoft.com/office/infopath/2007/PartnerControls"/>
+    <ds:schemaRef ds:uri="http://schemas.openxmlformats.org/package/2006/metadata/core-properties"/>
+    <ds:schemaRef ds:uri="http://schemas.microsoft.com/office/2006/documentManagement/types"/>
+    <ds:schemaRef ds:uri="http://schemas.microsoft.com/office/2006/metadata/properties"/>
+    <ds:schemaRef ds:uri="http://www.w3.org/XML/1998/namespace"/>
+    <ds:schemaRef ds:uri="http://purl.org/dc/dcmitype/"/>
   </ds:schemaRefs>
 </ds:datastoreItem>
 </file>
</xml_diff>